<commit_message>
edited my slide notes for presentation
</commit_message>
<xml_diff>
--- a/Team Docs/Project Summary.pptx
+++ b/Team Docs/Project Summary.pptx
@@ -707,11 +707,11 @@
               <a:buChar char="•"/>
             </a:pPr>
             <a:r>
-              <a:rPr lang="en-CA" dirty="0" smtClean="0"/>
+              <a:rPr lang="en-CA" dirty="0"/>
               <a:t>As</a:t>
             </a:r>
             <a:r>
-              <a:rPr lang="en-CA" baseline="0" dirty="0" smtClean="0"/>
+              <a:rPr lang="en-CA" baseline="0" dirty="0"/>
               <a:t> you all know, food waste is food that could have been eaten but was thrown away or composted instead.</a:t>
             </a:r>
             <a:endParaRPr lang="en-CA" dirty="0"/>
@@ -723,13 +723,8 @@
             </a:pPr>
             <a:r>
               <a:rPr lang="en-CA" dirty="0"/>
-              <a:t>1/3 of food produced in Canada is </a:t>
-            </a:r>
-            <a:r>
-              <a:rPr lang="en-CA" dirty="0" smtClean="0"/>
-              <a:t>wasted. </a:t>
-            </a:r>
-            <a:endParaRPr lang="en-CA" dirty="0"/>
+              <a:t>1/3 of food produced in Canada is wasted. </a:t>
+            </a:r>
           </a:p>
           <a:p>
             <a:pPr marL="171450" indent="-171450">
@@ -738,11 +733,7 @@
             </a:pPr>
             <a:r>
               <a:rPr lang="en-CA" dirty="0"/>
-              <a:t>47% of which is due to </a:t>
-            </a:r>
-            <a:r>
-              <a:rPr lang="en-CA" dirty="0" smtClean="0"/>
-              <a:t>consumers. </a:t>
+              <a:t>47% of which is due to consumers. </a:t>
             </a:r>
           </a:p>
           <a:p>
@@ -751,11 +742,11 @@
               <a:buChar char="•"/>
             </a:pPr>
             <a:r>
-              <a:rPr lang="en-CA" dirty="0" smtClean="0"/>
+              <a:rPr lang="en-CA" dirty="0"/>
               <a:t>The</a:t>
             </a:r>
             <a:r>
-              <a:rPr lang="en-CA" baseline="0" dirty="0" smtClean="0"/>
+              <a:rPr lang="en-CA" baseline="0" dirty="0"/>
               <a:t> preferred method of reducing food waste of course starts with source reduction. </a:t>
             </a:r>
           </a:p>
@@ -765,7 +756,7 @@
               <a:buChar char="•"/>
             </a:pPr>
             <a:r>
-              <a:rPr lang="en-CA" baseline="0" dirty="0" smtClean="0"/>
+              <a:rPr lang="en-CA" baseline="0" dirty="0"/>
               <a:t>Which means reducing the volume of surplus of food generated and of course that starts with the individual.</a:t>
             </a:r>
           </a:p>
@@ -775,11 +766,11 @@
               <a:buChar char="•"/>
             </a:pPr>
             <a:r>
-              <a:rPr lang="en-CA" baseline="0" dirty="0" err="1" smtClean="0"/>
+              <a:rPr lang="en-CA" baseline="0" dirty="0" err="1"/>
               <a:t>Ie</a:t>
             </a:r>
             <a:r>
-              <a:rPr lang="en-CA" baseline="0" dirty="0" smtClean="0"/>
+              <a:rPr lang="en-CA" baseline="0" dirty="0"/>
               <a:t>: have a shopping list when you go to the grocery store, know what you already have in the fridge so you don’t overbuy during your next grocery shop.</a:t>
             </a:r>
           </a:p>
@@ -1350,17 +1341,53 @@
             </a:pPr>
             <a:r>
               <a:rPr lang="en-CA" dirty="0"/>
-              <a:t>Notify users when food is about to expire</a:t>
-            </a:r>
-          </a:p>
-          <a:p>
-            <a:pPr marL="628650" lvl="1" indent="-171450">
+              <a:t>Be easy enough for shoppers to use that they will use the grocery list feature</a:t>
+            </a:r>
+          </a:p>
+          <a:p>
+            <a:pPr marL="628650" marR="0" lvl="1" indent="-171450" algn="l" defTabSz="914400" rtl="0" eaLnBrk="1" fontAlgn="auto" latinLnBrk="0" hangingPunct="1">
+              <a:lnSpc>
+                <a:spcPct val="100000"/>
+              </a:lnSpc>
+              <a:spcBef>
+                <a:spcPts val="0"/>
+              </a:spcBef>
+              <a:spcAft>
+                <a:spcPts val="0"/>
+              </a:spcAft>
+              <a:buClrTx/>
+              <a:buSzTx/>
               <a:buFont typeface="Arial" panose="020B0604020202020204" pitchFamily="34" charset="0"/>
               <a:buChar char="•"/>
+              <a:tabLst/>
+              <a:defRPr/>
             </a:pPr>
             <a:r>
               <a:rPr lang="en-CA" dirty="0"/>
-              <a:t>Be easy for shoppers to use</a:t>
+              <a:t>Notify users when food is about to expire</a:t>
+            </a:r>
+          </a:p>
+          <a:p>
+            <a:pPr marL="628650" marR="0" lvl="1" indent="-171450" algn="l" defTabSz="914400" rtl="0" eaLnBrk="1" fontAlgn="auto" latinLnBrk="0" hangingPunct="1">
+              <a:lnSpc>
+                <a:spcPct val="100000"/>
+              </a:lnSpc>
+              <a:spcBef>
+                <a:spcPts val="0"/>
+              </a:spcBef>
+              <a:spcAft>
+                <a:spcPts val="0"/>
+              </a:spcAft>
+              <a:buClrTx/>
+              <a:buSzTx/>
+              <a:buFont typeface="Arial" panose="020B0604020202020204" pitchFamily="34" charset="0"/>
+              <a:buChar char="•"/>
+              <a:tabLst/>
+              <a:defRPr/>
+            </a:pPr>
+            <a:r>
+              <a:rPr lang="en-CA" dirty="0"/>
+              <a:t>App must be able to pull and store the correct data from server-side</a:t>
             </a:r>
           </a:p>
         </p:txBody>
@@ -1446,78 +1473,74 @@
           <a:lstStyle/>
           <a:p>
             <a:r>
-              <a:rPr lang="en-CA" dirty="0" smtClean="0"/>
+              <a:rPr lang="en-CA" dirty="0"/>
               <a:t>Toni</a:t>
             </a:r>
           </a:p>
           <a:p>
-            <a:r>
-              <a:rPr lang="en-CA" dirty="0" smtClean="0"/>
-              <a:t/>
-            </a:r>
             <a:br>
-              <a:rPr lang="en-CA" dirty="0" smtClean="0"/>
+              <a:rPr lang="en-CA" dirty="0"/>
             </a:br>
             <a:r>
-              <a:rPr lang="en-CA" dirty="0" smtClean="0"/>
+              <a:rPr lang="en-CA" dirty="0"/>
               <a:t>As you can see from the risks, we identified</a:t>
             </a:r>
             <a:r>
-              <a:rPr lang="en-CA" baseline="0" dirty="0" smtClean="0"/>
+              <a:rPr lang="en-CA" baseline="0" dirty="0"/>
               <a:t> four major factors that hinder project completion: overestimating scope, lack of specificity, missed deadlines, tech failure. </a:t>
             </a:r>
           </a:p>
           <a:p>
-            <a:endParaRPr lang="en-CA" baseline="0" dirty="0" smtClean="0"/>
-          </a:p>
-          <a:p>
-            <a:r>
-              <a:rPr lang="en-CA" baseline="0" dirty="0" smtClean="0"/>
+            <a:endParaRPr lang="en-CA" baseline="0" dirty="0"/>
+          </a:p>
+          <a:p>
+            <a:r>
+              <a:rPr lang="en-CA" baseline="0" dirty="0"/>
               <a:t>Number one is the most likely, overestimating the scope of the work that we have to do, and how we’re going to prevent that from happening is through</a:t>
             </a:r>
           </a:p>
           <a:p>
             <a:r>
-              <a:rPr lang="en-CA" baseline="0" dirty="0" smtClean="0"/>
+              <a:rPr lang="en-CA" baseline="0" dirty="0"/>
               <a:t>identifying all necessary functions and technologies during the planning process. </a:t>
             </a:r>
           </a:p>
           <a:p>
-            <a:endParaRPr lang="en-CA" baseline="0" dirty="0" smtClean="0"/>
-          </a:p>
-          <a:p>
-            <a:r>
-              <a:rPr lang="en-CA" baseline="0" dirty="0" smtClean="0"/>
+            <a:endParaRPr lang="en-CA" baseline="0" dirty="0"/>
+          </a:p>
+          <a:p>
+            <a:r>
+              <a:rPr lang="en-CA" baseline="0" dirty="0"/>
               <a:t>We also want to be specific in our goals - we figured without clear cut goals we won’t be getting things done as fast. </a:t>
             </a:r>
           </a:p>
           <a:p>
-            <a:endParaRPr lang="en-CA" baseline="0" dirty="0" smtClean="0"/>
-          </a:p>
-          <a:p>
-            <a:r>
-              <a:rPr lang="en-CA" baseline="0" dirty="0" smtClean="0"/>
+            <a:endParaRPr lang="en-CA" baseline="0" dirty="0"/>
+          </a:p>
+          <a:p>
+            <a:r>
+              <a:rPr lang="en-CA" baseline="0" dirty="0"/>
               <a:t>Next is missed deadline, this has a very low probability of happening as our team is very on top of everything and we are using SCRUM to track project progress and we help </a:t>
             </a:r>
             <a:r>
-              <a:rPr lang="en-CA" baseline="0" dirty="0" err="1" smtClean="0"/>
+              <a:rPr lang="en-CA" baseline="0" dirty="0" err="1"/>
               <a:t>eachother</a:t>
             </a:r>
             <a:r>
-              <a:rPr lang="en-CA" baseline="0" dirty="0" smtClean="0"/>
+              <a:rPr lang="en-CA" baseline="0" dirty="0"/>
               <a:t> with challenging tasks. </a:t>
             </a:r>
           </a:p>
           <a:p>
-            <a:endParaRPr lang="en-CA" baseline="0" dirty="0" smtClean="0"/>
-          </a:p>
-          <a:p>
-            <a:r>
-              <a:rPr lang="en-CA" baseline="0" dirty="0" smtClean="0"/>
+            <a:endParaRPr lang="en-CA" baseline="0" dirty="0"/>
+          </a:p>
+          <a:p>
+            <a:r>
+              <a:rPr lang="en-CA" baseline="0" dirty="0"/>
               <a:t>And last but not least, we thought about another factor, failing to use technology correctly, and we plan to avoid this by using familiar technology that gets the job done and ask instructors for help </a:t>
             </a:r>
             <a:r>
-              <a:rPr lang="en-CA" baseline="0" smtClean="0"/>
+              <a:rPr lang="en-CA" baseline="0"/>
               <a:t>if necessary. </a:t>
             </a:r>
             <a:endParaRPr lang="en-CA" dirty="0"/>
@@ -13204,7 +13227,7 @@
             <a:pPr lvl="0"/>
             <a:r>
               <a:rPr lang="en-US" dirty="0"/>
-              <a:t>Automatically transfer items checked off grocery lists into a fridge list.</a:t>
+              <a:t>Automatically transfer items checked off grocery lists into a “fridge” list.</a:t>
             </a:r>
             <a:endParaRPr lang="en-CA" dirty="0"/>
           </a:p>
@@ -13493,7 +13516,16 @@
           </a:bodyPr>
           <a:lstStyle/>
           <a:p>
+            <a:r>
+              <a:rPr lang="en-US" sz="2400" dirty="0"/>
+              <a:t>UI/UX is easy to use, and intuitive for the typical grocery shopper.</a:t>
+            </a:r>
+          </a:p>
+          <a:p>
             <a:pPr lvl="0"/>
+            <a:endParaRPr lang="en-US" sz="2400" dirty="0"/>
+          </a:p>
+          <a:p>
             <a:r>
               <a:rPr lang="en-US" sz="2400" dirty="0"/>
               <a:t>App accurately notifies you when food is about to expire.</a:t>
@@ -13501,14 +13533,6 @@
           </a:p>
           <a:p>
             <a:pPr lvl="0"/>
-            <a:endParaRPr lang="en-CA" sz="2400" dirty="0"/>
-          </a:p>
-          <a:p>
-            <a:pPr lvl="0"/>
-            <a:r>
-              <a:rPr lang="en-US" sz="2400" dirty="0"/>
-              <a:t>UI/UX is easy to use, and intuitive for the typical grocery shopper.</a:t>
-            </a:r>
             <a:endParaRPr lang="en-CA" sz="2400" dirty="0"/>
           </a:p>
           <a:p>
@@ -13601,28 +13625,28 @@
                 <a:gridCol w="2149035">
                   <a:extLst>
                     <a:ext uri="{9D8B030D-6E8A-4147-A177-3AD203B41FA5}">
-                      <a16:colId xmlns:a16="http://schemas.microsoft.com/office/drawing/2014/main" xmlns="" val="2785451794"/>
+                      <a16:colId xmlns:a16="http://schemas.microsoft.com/office/drawing/2014/main" val="2785451794"/>
                     </a:ext>
                   </a:extLst>
                 </a:gridCol>
                 <a:gridCol w="2149035">
                   <a:extLst>
                     <a:ext uri="{9D8B030D-6E8A-4147-A177-3AD203B41FA5}">
-                      <a16:colId xmlns:a16="http://schemas.microsoft.com/office/drawing/2014/main" xmlns="" val="4019512300"/>
+                      <a16:colId xmlns:a16="http://schemas.microsoft.com/office/drawing/2014/main" val="4019512300"/>
                     </a:ext>
                   </a:extLst>
                 </a:gridCol>
                 <a:gridCol w="2149035">
                   <a:extLst>
                     <a:ext uri="{9D8B030D-6E8A-4147-A177-3AD203B41FA5}">
-                      <a16:colId xmlns:a16="http://schemas.microsoft.com/office/drawing/2014/main" xmlns="" val="2761056954"/>
+                      <a16:colId xmlns:a16="http://schemas.microsoft.com/office/drawing/2014/main" val="2761056954"/>
                     </a:ext>
                   </a:extLst>
                 </a:gridCol>
                 <a:gridCol w="2149035">
                   <a:extLst>
                     <a:ext uri="{9D8B030D-6E8A-4147-A177-3AD203B41FA5}">
-                      <a16:colId xmlns:a16="http://schemas.microsoft.com/office/drawing/2014/main" xmlns="" val="3906784518"/>
+                      <a16:colId xmlns:a16="http://schemas.microsoft.com/office/drawing/2014/main" val="3906784518"/>
                     </a:ext>
                   </a:extLst>
                 </a:gridCol>
@@ -13770,7 +13794,7 @@
                 </a:tc>
                 <a:extLst>
                   <a:ext uri="{0D108BD9-81ED-4DB2-BD59-A6C34878D82A}">
-                    <a16:rowId xmlns:a16="http://schemas.microsoft.com/office/drawing/2014/main" xmlns="" val="2851917135"/>
+                    <a16:rowId xmlns:a16="http://schemas.microsoft.com/office/drawing/2014/main" val="2851917135"/>
                   </a:ext>
                 </a:extLst>
               </a:tr>
@@ -13928,7 +13952,7 @@
                 </a:tc>
                 <a:extLst>
                   <a:ext uri="{0D108BD9-81ED-4DB2-BD59-A6C34878D82A}">
-                    <a16:rowId xmlns:a16="http://schemas.microsoft.com/office/drawing/2014/main" xmlns="" val="969570850"/>
+                    <a16:rowId xmlns:a16="http://schemas.microsoft.com/office/drawing/2014/main" val="969570850"/>
                   </a:ext>
                 </a:extLst>
               </a:tr>
@@ -14086,7 +14110,7 @@
                 </a:tc>
                 <a:extLst>
                   <a:ext uri="{0D108BD9-81ED-4DB2-BD59-A6C34878D82A}">
-                    <a16:rowId xmlns:a16="http://schemas.microsoft.com/office/drawing/2014/main" xmlns="" val="1182322791"/>
+                    <a16:rowId xmlns:a16="http://schemas.microsoft.com/office/drawing/2014/main" val="1182322791"/>
                   </a:ext>
                 </a:extLst>
               </a:tr>
@@ -14244,7 +14268,7 @@
                 </a:tc>
                 <a:extLst>
                   <a:ext uri="{0D108BD9-81ED-4DB2-BD59-A6C34878D82A}">
-                    <a16:rowId xmlns:a16="http://schemas.microsoft.com/office/drawing/2014/main" xmlns="" val="2803583754"/>
+                    <a16:rowId xmlns:a16="http://schemas.microsoft.com/office/drawing/2014/main" val="2803583754"/>
                   </a:ext>
                 </a:extLst>
               </a:tr>
@@ -14402,7 +14426,7 @@
                 </a:tc>
                 <a:extLst>
                   <a:ext uri="{0D108BD9-81ED-4DB2-BD59-A6C34878D82A}">
-                    <a16:rowId xmlns:a16="http://schemas.microsoft.com/office/drawing/2014/main" xmlns="" val="1505999084"/>
+                    <a16:rowId xmlns:a16="http://schemas.microsoft.com/office/drawing/2014/main" val="1505999084"/>
                   </a:ext>
                 </a:extLst>
               </a:tr>

</xml_diff>

<commit_message>
Added my presentation notes to the slides
</commit_message>
<xml_diff>
--- a/Team Docs/Project Summary.pptx
+++ b/Team Docs/Project Summary.pptx
@@ -871,6 +871,10 @@
               <a:buFont typeface="Arial" panose="020B0604020202020204" pitchFamily="34" charset="0"/>
               <a:buChar char="•"/>
             </a:pPr>
+            <a:r>
+              <a:rPr lang="en-CA" dirty="0" smtClean="0"/>
+              <a:t>________________________________________________________________________</a:t>
+            </a:r>
             <a:endParaRPr lang="en-CA" dirty="0"/>
           </a:p>
           <a:p>
@@ -943,8 +947,144 @@
             </a:pPr>
             <a:r>
               <a:rPr lang="en-CA" dirty="0"/>
-              <a:t>Receive notifications when food is expiring (set times for reminders)</a:t>
-            </a:r>
+              <a:t>Receive notifications when food is expiring (set times for reminders</a:t>
+            </a:r>
+            <a:r>
+              <a:rPr lang="en-CA" dirty="0" smtClean="0"/>
+              <a:t>)</a:t>
+            </a:r>
+          </a:p>
+          <a:p>
+            <a:pPr marL="171450" indent="-171450">
+              <a:buFont typeface="Arial" panose="020B0604020202020204" pitchFamily="34" charset="0"/>
+              <a:buChar char="•"/>
+            </a:pPr>
+            <a:r>
+              <a:rPr lang="en-CA" dirty="0" smtClean="0"/>
+              <a:t>_______________________________________________________________________</a:t>
+            </a:r>
+          </a:p>
+          <a:p>
+            <a:r>
+              <a:rPr lang="en-CA" sz="1200" b="1" u="sng" kern="1200" dirty="0" smtClean="0">
+                <a:solidFill>
+                  <a:schemeClr val="tx1"/>
+                </a:solidFill>
+                <a:effectLst/>
+                <a:latin typeface="+mn-lt"/>
+                <a:ea typeface="+mn-ea"/>
+                <a:cs typeface="+mn-cs"/>
+              </a:rPr>
+              <a:t>Presentation Notes</a:t>
+            </a:r>
+          </a:p>
+          <a:p>
+            <a:r>
+              <a:rPr lang="en-CA" sz="1200" kern="1200" dirty="0" smtClean="0">
+                <a:solidFill>
+                  <a:schemeClr val="tx1"/>
+                </a:solidFill>
+                <a:effectLst/>
+                <a:latin typeface="+mn-lt"/>
+                <a:ea typeface="+mn-ea"/>
+                <a:cs typeface="+mn-cs"/>
+              </a:rPr>
+              <a:t>So, you might be wondering what are our goals and objectives. </a:t>
+            </a:r>
+          </a:p>
+          <a:p>
+            <a:r>
+              <a:rPr lang="en-CA" sz="1200" kern="1200" dirty="0" smtClean="0">
+                <a:solidFill>
+                  <a:schemeClr val="tx1"/>
+                </a:solidFill>
+                <a:effectLst/>
+                <a:latin typeface="+mn-lt"/>
+                <a:ea typeface="+mn-ea"/>
+                <a:cs typeface="+mn-cs"/>
+              </a:rPr>
+              <a:t>It all comes back to the idea of making an impact in food waste reduction, while keeping things simple so that it never feels like it’s a chore for the user.</a:t>
+            </a:r>
+          </a:p>
+          <a:p>
+            <a:endParaRPr lang="en-CA" sz="1200" kern="1200" dirty="0" smtClean="0">
+              <a:solidFill>
+                <a:schemeClr val="tx1"/>
+              </a:solidFill>
+              <a:effectLst/>
+              <a:latin typeface="+mn-lt"/>
+              <a:ea typeface="+mn-ea"/>
+              <a:cs typeface="+mn-cs"/>
+            </a:endParaRPr>
+          </a:p>
+          <a:p>
+            <a:r>
+              <a:rPr lang="en-CA" sz="1200" kern="1200" dirty="0" smtClean="0">
+                <a:solidFill>
+                  <a:schemeClr val="tx1"/>
+                </a:solidFill>
+                <a:effectLst/>
+                <a:latin typeface="+mn-lt"/>
+                <a:ea typeface="+mn-ea"/>
+                <a:cs typeface="+mn-cs"/>
+              </a:rPr>
+              <a:t>Making a grocery list of what you need might be easy, but keeping track of everything you buy is not. </a:t>
+            </a:r>
+          </a:p>
+          <a:p>
+            <a:endParaRPr lang="en-CA" sz="1200" kern="1200" dirty="0" smtClean="0">
+              <a:solidFill>
+                <a:schemeClr val="tx1"/>
+              </a:solidFill>
+              <a:effectLst/>
+              <a:latin typeface="+mn-lt"/>
+              <a:ea typeface="+mn-ea"/>
+              <a:cs typeface="+mn-cs"/>
+            </a:endParaRPr>
+          </a:p>
+          <a:p>
+            <a:r>
+              <a:rPr lang="en-CA" sz="1200" kern="1200" dirty="0" smtClean="0">
+                <a:solidFill>
+                  <a:schemeClr val="tx1"/>
+                </a:solidFill>
+                <a:effectLst/>
+                <a:latin typeface="+mn-lt"/>
+                <a:ea typeface="+mn-ea"/>
+                <a:cs typeface="+mn-cs"/>
+              </a:rPr>
+              <a:t>Our app integrates an expiration tracker with the user’s shopping list to help you keep track of the shelf-life of your perishable food items. </a:t>
+            </a:r>
+            <a:br>
+              <a:rPr lang="en-CA" sz="1200" kern="1200" dirty="0" smtClean="0">
+                <a:solidFill>
+                  <a:schemeClr val="tx1"/>
+                </a:solidFill>
+                <a:effectLst/>
+                <a:latin typeface="+mn-lt"/>
+                <a:ea typeface="+mn-ea"/>
+                <a:cs typeface="+mn-cs"/>
+              </a:rPr>
+            </a:br>
+            <a:r>
+              <a:rPr lang="en-CA" sz="1200" kern="1200" dirty="0" smtClean="0">
+                <a:solidFill>
+                  <a:schemeClr val="tx1"/>
+                </a:solidFill>
+                <a:effectLst/>
+                <a:latin typeface="+mn-lt"/>
+                <a:ea typeface="+mn-ea"/>
+                <a:cs typeface="+mn-cs"/>
+              </a:rPr>
+              <a:t>User experience is important to us, and we plan to focus on making the app both convenient and intuitive so that you can plan your grocery shopping with ease and make the most out of your food purchases.</a:t>
+            </a:r>
+          </a:p>
+          <a:p>
+            <a:pPr marL="171450" indent="-171450">
+              <a:buFont typeface="Arial" panose="020B0604020202020204" pitchFamily="34" charset="0"/>
+              <a:buChar char="•"/>
+            </a:pPr>
+            <a:endParaRPr lang="en-CA" dirty="0"/>
           </a:p>
         </p:txBody>
       </p:sp>
@@ -1478,6 +1618,10 @@
             </a:r>
           </a:p>
           <a:p>
+            <a:r>
+              <a:rPr lang="en-CA" dirty="0"/>
+              <a:t/>
+            </a:r>
             <a:br>
               <a:rPr lang="en-CA" dirty="0"/>
             </a:br>
@@ -1642,6 +1786,10 @@
               <a:buFont typeface="Arial" panose="020B0604020202020204" pitchFamily="34" charset="0"/>
               <a:buChar char="•"/>
             </a:pPr>
+            <a:r>
+              <a:rPr lang="en-CA" dirty="0" smtClean="0"/>
+              <a:t>_______________________________________________________________________________________</a:t>
+            </a:r>
             <a:endParaRPr lang="en-CA" dirty="0"/>
           </a:p>
           <a:p>
@@ -1651,7 +1799,11 @@
             </a:pPr>
             <a:r>
               <a:rPr lang="en-CA" dirty="0"/>
-              <a:t>People who benefit from our project would be:</a:t>
+              <a:t>People who benefit from our project would </a:t>
+            </a:r>
+            <a:r>
+              <a:rPr lang="en-CA" dirty="0" smtClean="0"/>
+              <a:t>be:</a:t>
             </a:r>
           </a:p>
           <a:p>
@@ -1660,8 +1812,12 @@
               <a:buChar char="•"/>
             </a:pPr>
             <a:r>
+              <a:rPr lang="en-CA" dirty="0" smtClean="0"/>
+              <a:t>Us </a:t>
+            </a:r>
+            <a:r>
               <a:rPr lang="en-CA" dirty="0"/>
-              <a:t>Us – because we want to get good grades and create a cool app</a:t>
+              <a:t>– because we want to get good grades and create a cool app</a:t>
             </a:r>
           </a:p>
           <a:p>
@@ -1671,7 +1827,11 @@
             </a:pPr>
             <a:r>
               <a:rPr lang="en-CA" dirty="0"/>
-              <a:t>Metro Vancouver – because we want to help reduce food loss and benefit the city</a:t>
+              <a:t>Metro Vancouver – because we want to help reduce food loss and benefit the </a:t>
+            </a:r>
+            <a:r>
+              <a:rPr lang="en-CA" dirty="0" smtClean="0"/>
+              <a:t>city</a:t>
             </a:r>
           </a:p>
           <a:p>
@@ -1681,8 +1841,237 @@
             </a:pPr>
             <a:r>
               <a:rPr lang="en-CA" dirty="0"/>
-              <a:t>CST Faculty – because they get to show off our work to other teachers and people in the industry</a:t>
-            </a:r>
+              <a:t>CST Faculty – because </a:t>
+            </a:r>
+            <a:r>
+              <a:rPr lang="en-CA" dirty="0" smtClean="0"/>
+              <a:t>they </a:t>
+            </a:r>
+            <a:r>
+              <a:rPr lang="en-CA" dirty="0"/>
+              <a:t>get to show off our work to other teachers and people in the </a:t>
+            </a:r>
+            <a:r>
+              <a:rPr lang="en-CA" dirty="0" smtClean="0"/>
+              <a:t>industry</a:t>
+            </a:r>
+          </a:p>
+          <a:p>
+            <a:pPr marL="628650" lvl="1" indent="-171450">
+              <a:buFont typeface="Arial" panose="020B0604020202020204" pitchFamily="34" charset="0"/>
+              <a:buChar char="•"/>
+            </a:pPr>
+            <a:r>
+              <a:rPr lang="en-CA" dirty="0" smtClean="0"/>
+              <a:t>__________________________________________________________________________________________________</a:t>
+            </a:r>
+          </a:p>
+          <a:p>
+            <a:pPr marL="628650" lvl="1" indent="-171450">
+              <a:buFont typeface="Arial" panose="020B0604020202020204" pitchFamily="34" charset="0"/>
+              <a:buChar char="•"/>
+            </a:pPr>
+            <a:endParaRPr lang="en-CA" dirty="0" smtClean="0"/>
+          </a:p>
+          <a:p>
+            <a:r>
+              <a:rPr lang="en-CA" sz="1200" b="1" u="sng" kern="1200" dirty="0" smtClean="0">
+                <a:solidFill>
+                  <a:schemeClr val="tx1"/>
+                </a:solidFill>
+                <a:effectLst/>
+                <a:latin typeface="+mn-lt"/>
+                <a:ea typeface="+mn-ea"/>
+                <a:cs typeface="+mn-cs"/>
+              </a:rPr>
+              <a:t>Presentation</a:t>
+            </a:r>
+            <a:r>
+              <a:rPr lang="en-CA" sz="1200" b="1" u="sng" kern="1200" baseline="0" dirty="0" smtClean="0">
+                <a:solidFill>
+                  <a:schemeClr val="tx1"/>
+                </a:solidFill>
+                <a:effectLst/>
+                <a:latin typeface="+mn-lt"/>
+                <a:ea typeface="+mn-ea"/>
+                <a:cs typeface="+mn-cs"/>
+              </a:rPr>
+              <a:t> notes</a:t>
+            </a:r>
+            <a:endParaRPr lang="en-CA" sz="1200" b="1" u="sng" kern="1200" dirty="0" smtClean="0">
+              <a:solidFill>
+                <a:schemeClr val="tx1"/>
+              </a:solidFill>
+              <a:effectLst/>
+              <a:latin typeface="+mn-lt"/>
+              <a:ea typeface="+mn-ea"/>
+              <a:cs typeface="+mn-cs"/>
+            </a:endParaRPr>
+          </a:p>
+          <a:p>
+            <a:r>
+              <a:rPr lang="en-CA" sz="1200" kern="1200" dirty="0" smtClean="0">
+                <a:solidFill>
+                  <a:schemeClr val="tx1"/>
+                </a:solidFill>
+                <a:effectLst/>
+                <a:latin typeface="+mn-lt"/>
+                <a:ea typeface="+mn-ea"/>
+                <a:cs typeface="+mn-cs"/>
+              </a:rPr>
+              <a:t>Now that you we’ve established some of the main risks, the next question is who is affected? </a:t>
+            </a:r>
+          </a:p>
+          <a:p>
+            <a:endParaRPr lang="en-CA" sz="1200" kern="1200" dirty="0" smtClean="0">
+              <a:solidFill>
+                <a:schemeClr val="tx1"/>
+              </a:solidFill>
+              <a:effectLst/>
+              <a:latin typeface="+mn-lt"/>
+              <a:ea typeface="+mn-ea"/>
+              <a:cs typeface="+mn-cs"/>
+            </a:endParaRPr>
+          </a:p>
+          <a:p>
+            <a:r>
+              <a:rPr lang="en-CA" sz="1200" kern="1200" dirty="0" smtClean="0">
+                <a:solidFill>
+                  <a:schemeClr val="tx1"/>
+                </a:solidFill>
+                <a:effectLst/>
+                <a:latin typeface="+mn-lt"/>
+                <a:ea typeface="+mn-ea"/>
+                <a:cs typeface="+mn-cs"/>
+              </a:rPr>
+              <a:t>Well, first and foremost, us!</a:t>
+            </a:r>
+            <a:br>
+              <a:rPr lang="en-CA" sz="1200" kern="1200" dirty="0" smtClean="0">
+                <a:solidFill>
+                  <a:schemeClr val="tx1"/>
+                </a:solidFill>
+                <a:effectLst/>
+                <a:latin typeface="+mn-lt"/>
+                <a:ea typeface="+mn-ea"/>
+                <a:cs typeface="+mn-cs"/>
+              </a:rPr>
+            </a:br>
+            <a:r>
+              <a:rPr lang="en-CA" sz="1200" kern="1200" dirty="0" smtClean="0">
+                <a:solidFill>
+                  <a:schemeClr val="tx1"/>
+                </a:solidFill>
+                <a:effectLst/>
+                <a:latin typeface="+mn-lt"/>
+                <a:ea typeface="+mn-ea"/>
+                <a:cs typeface="+mn-cs"/>
+              </a:rPr>
+              <a:t>We’re taking this opportunity in full stride to really push ourselves to learn more and see just what we can accomplish as a team.  And it goes without saying, of course, that we want to get a good mark.</a:t>
+            </a:r>
+          </a:p>
+          <a:p>
+            <a:endParaRPr lang="en-CA" sz="1200" kern="1200" dirty="0" smtClean="0">
+              <a:solidFill>
+                <a:schemeClr val="tx1"/>
+              </a:solidFill>
+              <a:effectLst/>
+              <a:latin typeface="+mn-lt"/>
+              <a:ea typeface="+mn-ea"/>
+              <a:cs typeface="+mn-cs"/>
+            </a:endParaRPr>
+          </a:p>
+          <a:p>
+            <a:r>
+              <a:rPr lang="en-CA" sz="1200" kern="1200" dirty="0" smtClean="0">
+                <a:solidFill>
+                  <a:schemeClr val="tx1"/>
+                </a:solidFill>
+                <a:effectLst/>
+                <a:latin typeface="+mn-lt"/>
+                <a:ea typeface="+mn-ea"/>
+                <a:cs typeface="+mn-cs"/>
+              </a:rPr>
+              <a:t>Metro Vancouver!</a:t>
+            </a:r>
+            <a:br>
+              <a:rPr lang="en-CA" sz="1200" kern="1200" dirty="0" smtClean="0">
+                <a:solidFill>
+                  <a:schemeClr val="tx1"/>
+                </a:solidFill>
+                <a:effectLst/>
+                <a:latin typeface="+mn-lt"/>
+                <a:ea typeface="+mn-ea"/>
+                <a:cs typeface="+mn-cs"/>
+              </a:rPr>
+            </a:br>
+            <a:r>
+              <a:rPr lang="en-CA" sz="1200" kern="1200" dirty="0" smtClean="0">
+                <a:solidFill>
+                  <a:schemeClr val="tx1"/>
+                </a:solidFill>
+                <a:effectLst/>
+                <a:latin typeface="+mn-lt"/>
+                <a:ea typeface="+mn-ea"/>
+                <a:cs typeface="+mn-cs"/>
+              </a:rPr>
+              <a:t>They are also stakeholders because we want to help reduce food waste to lessen the impact on the environment in metro Vancouver. </a:t>
+            </a:r>
+          </a:p>
+          <a:p>
+            <a:endParaRPr lang="en-CA" sz="1200" kern="1200" dirty="0" smtClean="0">
+              <a:solidFill>
+                <a:schemeClr val="tx1"/>
+              </a:solidFill>
+              <a:effectLst/>
+              <a:latin typeface="+mn-lt"/>
+              <a:ea typeface="+mn-ea"/>
+              <a:cs typeface="+mn-cs"/>
+            </a:endParaRPr>
+          </a:p>
+          <a:p>
+            <a:r>
+              <a:rPr lang="en-CA" sz="1200" kern="1200" dirty="0" smtClean="0">
+                <a:solidFill>
+                  <a:schemeClr val="tx1"/>
+                </a:solidFill>
+                <a:effectLst/>
+                <a:latin typeface="+mn-lt"/>
+                <a:ea typeface="+mn-ea"/>
+                <a:cs typeface="+mn-cs"/>
+              </a:rPr>
+              <a:t>Finally, you guys! The wonderful BCIT faculty of CST.</a:t>
+            </a:r>
+            <a:br>
+              <a:rPr lang="en-CA" sz="1200" kern="1200" dirty="0" smtClean="0">
+                <a:solidFill>
+                  <a:schemeClr val="tx1"/>
+                </a:solidFill>
+                <a:effectLst/>
+                <a:latin typeface="+mn-lt"/>
+                <a:ea typeface="+mn-ea"/>
+                <a:cs typeface="+mn-cs"/>
+              </a:rPr>
+            </a:br>
+            <a:r>
+              <a:rPr lang="en-CA" sz="1200" kern="1200" dirty="0" smtClean="0">
+                <a:solidFill>
+                  <a:schemeClr val="tx1"/>
+                </a:solidFill>
+                <a:effectLst/>
+                <a:latin typeface="+mn-lt"/>
+                <a:ea typeface="+mn-ea"/>
+                <a:cs typeface="+mn-cs"/>
+              </a:rPr>
+              <a:t>We want to show what students taught by the professors of CST are capable of, so that it exemplifies the results of your teaching.</a:t>
+            </a:r>
+          </a:p>
+          <a:p>
+            <a:pPr marL="457200" lvl="1" indent="0">
+              <a:buFont typeface="Arial" panose="020B0604020202020204" pitchFamily="34" charset="0"/>
+              <a:buNone/>
+            </a:pPr>
+            <a:endParaRPr lang="en-CA" dirty="0" smtClean="0"/>
           </a:p>
         </p:txBody>
       </p:sp>
@@ -7565,7 +7954,7 @@
           <p:nvPr>
             <p:extLst>
               <p:ext uri="{386F3935-93C4-4BCD-93E2-E3B085C9AB24}">
-                <p16:designElem xmlns:p16="http://schemas.microsoft.com/office/powerpoint/2015/main" val="1"/>
+                <p16:designElem xmlns:p16="http://schemas.microsoft.com/office/powerpoint/2015/main" xmlns="" val="1"/>
               </p:ext>
             </p:extLst>
           </p:nvPr>
@@ -13625,28 +14014,28 @@
                 <a:gridCol w="2149035">
                   <a:extLst>
                     <a:ext uri="{9D8B030D-6E8A-4147-A177-3AD203B41FA5}">
-                      <a16:colId xmlns:a16="http://schemas.microsoft.com/office/drawing/2014/main" val="2785451794"/>
+                      <a16:colId xmlns:a16="http://schemas.microsoft.com/office/drawing/2014/main" xmlns="" val="2785451794"/>
                     </a:ext>
                   </a:extLst>
                 </a:gridCol>
                 <a:gridCol w="2149035">
                   <a:extLst>
                     <a:ext uri="{9D8B030D-6E8A-4147-A177-3AD203B41FA5}">
-                      <a16:colId xmlns:a16="http://schemas.microsoft.com/office/drawing/2014/main" val="4019512300"/>
+                      <a16:colId xmlns:a16="http://schemas.microsoft.com/office/drawing/2014/main" xmlns="" val="4019512300"/>
                     </a:ext>
                   </a:extLst>
                 </a:gridCol>
                 <a:gridCol w="2149035">
                   <a:extLst>
                     <a:ext uri="{9D8B030D-6E8A-4147-A177-3AD203B41FA5}">
-                      <a16:colId xmlns:a16="http://schemas.microsoft.com/office/drawing/2014/main" val="2761056954"/>
+                      <a16:colId xmlns:a16="http://schemas.microsoft.com/office/drawing/2014/main" xmlns="" val="2761056954"/>
                     </a:ext>
                   </a:extLst>
                 </a:gridCol>
                 <a:gridCol w="2149035">
                   <a:extLst>
                     <a:ext uri="{9D8B030D-6E8A-4147-A177-3AD203B41FA5}">
-                      <a16:colId xmlns:a16="http://schemas.microsoft.com/office/drawing/2014/main" val="3906784518"/>
+                      <a16:colId xmlns:a16="http://schemas.microsoft.com/office/drawing/2014/main" xmlns="" val="3906784518"/>
                     </a:ext>
                   </a:extLst>
                 </a:gridCol>
@@ -13794,7 +14183,7 @@
                 </a:tc>
                 <a:extLst>
                   <a:ext uri="{0D108BD9-81ED-4DB2-BD59-A6C34878D82A}">
-                    <a16:rowId xmlns:a16="http://schemas.microsoft.com/office/drawing/2014/main" val="2851917135"/>
+                    <a16:rowId xmlns:a16="http://schemas.microsoft.com/office/drawing/2014/main" xmlns="" val="2851917135"/>
                   </a:ext>
                 </a:extLst>
               </a:tr>
@@ -13952,7 +14341,7 @@
                 </a:tc>
                 <a:extLst>
                   <a:ext uri="{0D108BD9-81ED-4DB2-BD59-A6C34878D82A}">
-                    <a16:rowId xmlns:a16="http://schemas.microsoft.com/office/drawing/2014/main" val="969570850"/>
+                    <a16:rowId xmlns:a16="http://schemas.microsoft.com/office/drawing/2014/main" xmlns="" val="969570850"/>
                   </a:ext>
                 </a:extLst>
               </a:tr>
@@ -14110,7 +14499,7 @@
                 </a:tc>
                 <a:extLst>
                   <a:ext uri="{0D108BD9-81ED-4DB2-BD59-A6C34878D82A}">
-                    <a16:rowId xmlns:a16="http://schemas.microsoft.com/office/drawing/2014/main" val="1182322791"/>
+                    <a16:rowId xmlns:a16="http://schemas.microsoft.com/office/drawing/2014/main" xmlns="" val="1182322791"/>
                   </a:ext>
                 </a:extLst>
               </a:tr>
@@ -14268,7 +14657,7 @@
                 </a:tc>
                 <a:extLst>
                   <a:ext uri="{0D108BD9-81ED-4DB2-BD59-A6C34878D82A}">
-                    <a16:rowId xmlns:a16="http://schemas.microsoft.com/office/drawing/2014/main" val="2803583754"/>
+                    <a16:rowId xmlns:a16="http://schemas.microsoft.com/office/drawing/2014/main" xmlns="" val="2803583754"/>
                   </a:ext>
                 </a:extLst>
               </a:tr>
@@ -14426,7 +14815,7 @@
                 </a:tc>
                 <a:extLst>
                   <a:ext uri="{0D108BD9-81ED-4DB2-BD59-A6C34878D82A}">
-                    <a16:rowId xmlns:a16="http://schemas.microsoft.com/office/drawing/2014/main" val="1505999084"/>
+                    <a16:rowId xmlns:a16="http://schemas.microsoft.com/office/drawing/2014/main" xmlns="" val="1505999084"/>
                   </a:ext>
                 </a:extLst>
               </a:tr>

</xml_diff>

<commit_message>
git is telling me to upload project summary
</commit_message>
<xml_diff>
--- a/Team Docs/Project Summary.pptx
+++ b/Team Docs/Project Summary.pptx
@@ -116,11 +116,6 @@
       </a:defRPr>
     </a:lvl9pPr>
   </p:defaultTextStyle>
-  <p:extLst>
-    <p:ext uri="{EFAFB233-063F-42B5-8137-9DF3F51BA10A}">
-      <p15:sldGuideLst xmlns:p15="http://schemas.microsoft.com/office/powerpoint/2012/main"/>
-    </p:ext>
-  </p:extLst>
 </p:presentation>
 </file>
 
@@ -206,7 +201,7 @@
           <a:p>
             <a:fld id="{57FDE79B-D48A-4CFD-84B7-6CD308F98EF7}" type="datetimeFigureOut">
               <a:rPr lang="en-CA" smtClean="0"/>
-              <a:t>2017-05-01</a:t>
+              <a:t>2017-04-28</a:t>
             </a:fld>
             <a:endParaRPr lang="en-CA"/>
           </a:p>
@@ -706,14 +701,6 @@
               <a:buFont typeface="Arial" panose="020B0604020202020204" pitchFamily="34" charset="0"/>
               <a:buChar char="•"/>
             </a:pPr>
-            <a:r>
-              <a:rPr lang="en-CA" dirty="0" smtClean="0"/>
-              <a:t>As</a:t>
-            </a:r>
-            <a:r>
-              <a:rPr lang="en-CA" baseline="0" dirty="0" smtClean="0"/>
-              <a:t> you all know, food waste is food that could have been eaten but was thrown away or composted instead.</a:t>
-            </a:r>
             <a:endParaRPr lang="en-CA" dirty="0"/>
           </a:p>
           <a:p>
@@ -723,13 +710,8 @@
             </a:pPr>
             <a:r>
               <a:rPr lang="en-CA" dirty="0"/>
-              <a:t>1/3 of food produced in Canada is </a:t>
-            </a:r>
-            <a:r>
-              <a:rPr lang="en-CA" dirty="0" smtClean="0"/>
-              <a:t>wasted. </a:t>
-            </a:r>
-            <a:endParaRPr lang="en-CA" dirty="0"/>
+              <a:t>1/3 of food produced in Canada is wasted</a:t>
+            </a:r>
           </a:p>
           <a:p>
             <a:pPr marL="171450" indent="-171450">
@@ -738,49 +720,7 @@
             </a:pPr>
             <a:r>
               <a:rPr lang="en-CA" dirty="0"/>
-              <a:t>47% of which is due to </a:t>
-            </a:r>
-            <a:r>
-              <a:rPr lang="en-CA" dirty="0" smtClean="0"/>
-              <a:t>consumers. </a:t>
-            </a:r>
-          </a:p>
-          <a:p>
-            <a:pPr marL="171450" indent="-171450">
-              <a:buFont typeface="Arial" panose="020B0604020202020204" pitchFamily="34" charset="0"/>
-              <a:buChar char="•"/>
-            </a:pPr>
-            <a:r>
-              <a:rPr lang="en-CA" dirty="0" smtClean="0"/>
-              <a:t>The</a:t>
-            </a:r>
-            <a:r>
-              <a:rPr lang="en-CA" baseline="0" dirty="0" smtClean="0"/>
-              <a:t> preferred method of reducing food waste of course starts with source reduction. </a:t>
-            </a:r>
-          </a:p>
-          <a:p>
-            <a:pPr marL="171450" indent="-171450">
-              <a:buFont typeface="Arial" panose="020B0604020202020204" pitchFamily="34" charset="0"/>
-              <a:buChar char="•"/>
-            </a:pPr>
-            <a:r>
-              <a:rPr lang="en-CA" baseline="0" dirty="0" smtClean="0"/>
-              <a:t>Which means reducing the volume of surplus of food generated and of course that starts with the individual.</a:t>
-            </a:r>
-          </a:p>
-          <a:p>
-            <a:pPr marL="171450" indent="-171450">
-              <a:buFont typeface="Arial" panose="020B0604020202020204" pitchFamily="34" charset="0"/>
-              <a:buChar char="•"/>
-            </a:pPr>
-            <a:r>
-              <a:rPr lang="en-CA" baseline="0" dirty="0" err="1" smtClean="0"/>
-              <a:t>Ie</a:t>
-            </a:r>
-            <a:r>
-              <a:rPr lang="en-CA" baseline="0" dirty="0" smtClean="0"/>
-              <a:t>: have a shopping list when you go to the grocery store, know what you already have in the fridge so you don’t overbuy during your next grocery shop.</a:t>
+              <a:t>47% of which is due to consumers</a:t>
             </a:r>
           </a:p>
         </p:txBody>
@@ -1446,77 +1386,9 @@
           <a:lstStyle/>
           <a:p>
             <a:r>
-              <a:rPr lang="en-CA" dirty="0" smtClean="0"/>
+              <a:rPr lang="en-CA" dirty="0"/>
               <a:t>Toni</a:t>
             </a:r>
-          </a:p>
-          <a:p>
-            <a:r>
-              <a:rPr lang="en-CA" dirty="0" smtClean="0"/>
-              <a:t/>
-            </a:r>
-            <a:br>
-              <a:rPr lang="en-CA" dirty="0" smtClean="0"/>
-            </a:br>
-            <a:r>
-              <a:rPr lang="en-CA" dirty="0" smtClean="0"/>
-              <a:t>As you can see from the risks, we identified</a:t>
-            </a:r>
-            <a:r>
-              <a:rPr lang="en-CA" baseline="0" dirty="0" smtClean="0"/>
-              <a:t> four major factors that hinder project completion: overestimating scope, lack of specificity, missed deadlines, tech failure. </a:t>
-            </a:r>
-          </a:p>
-          <a:p>
-            <a:endParaRPr lang="en-CA" baseline="0" dirty="0" smtClean="0"/>
-          </a:p>
-          <a:p>
-            <a:r>
-              <a:rPr lang="en-CA" baseline="0" dirty="0" smtClean="0"/>
-              <a:t>Number one is the most likely, overestimating the scope of the work that we have to do, and how we’re going to prevent that from happening is through</a:t>
-            </a:r>
-          </a:p>
-          <a:p>
-            <a:r>
-              <a:rPr lang="en-CA" baseline="0" dirty="0" smtClean="0"/>
-              <a:t>identifying all necessary functions and technologies during the planning process. </a:t>
-            </a:r>
-          </a:p>
-          <a:p>
-            <a:endParaRPr lang="en-CA" baseline="0" dirty="0" smtClean="0"/>
-          </a:p>
-          <a:p>
-            <a:r>
-              <a:rPr lang="en-CA" baseline="0" dirty="0" smtClean="0"/>
-              <a:t>We also want to be specific in our goals - we figured without clear cut goals we won’t be getting things done as fast. </a:t>
-            </a:r>
-          </a:p>
-          <a:p>
-            <a:endParaRPr lang="en-CA" baseline="0" dirty="0" smtClean="0"/>
-          </a:p>
-          <a:p>
-            <a:r>
-              <a:rPr lang="en-CA" baseline="0" dirty="0" smtClean="0"/>
-              <a:t>Next is missed deadline, this has a very low probability of happening as our team is very on top of everything and we are using SCRUM to track project progress and we help </a:t>
-            </a:r>
-            <a:r>
-              <a:rPr lang="en-CA" baseline="0" dirty="0" err="1" smtClean="0"/>
-              <a:t>eachother</a:t>
-            </a:r>
-            <a:r>
-              <a:rPr lang="en-CA" baseline="0" dirty="0" smtClean="0"/>
-              <a:t> with challenging tasks. </a:t>
-            </a:r>
-          </a:p>
-          <a:p>
-            <a:endParaRPr lang="en-CA" baseline="0" dirty="0" smtClean="0"/>
-          </a:p>
-          <a:p>
-            <a:r>
-              <a:rPr lang="en-CA" baseline="0" dirty="0" smtClean="0"/>
-              <a:t>And last but not least, we thought about another factor, failing to use technology correctly, and we plan to avoid this by using familiar technology that gets the job done and ask instructors for help if necessary. </a:t>
-            </a:r>
-            <a:endParaRPr lang="en-CA" dirty="0"/>
           </a:p>
         </p:txBody>
       </p:sp>
@@ -2504,7 +2376,7 @@
           <a:p>
             <a:fld id="{D535FA3B-C92A-41BC-9641-F0D200EBA4B7}" type="datetimeFigureOut">
               <a:rPr lang="en-CA" smtClean="0"/>
-              <a:t>2017-05-01</a:t>
+              <a:t>2017-04-28</a:t>
             </a:fld>
             <a:endParaRPr lang="en-CA"/>
           </a:p>
@@ -2760,7 +2632,7 @@
           <a:p>
             <a:fld id="{D535FA3B-C92A-41BC-9641-F0D200EBA4B7}" type="datetimeFigureOut">
               <a:rPr lang="en-CA" smtClean="0"/>
-              <a:t>2017-05-01</a:t>
+              <a:t>2017-04-28</a:t>
             </a:fld>
             <a:endParaRPr lang="en-CA"/>
           </a:p>
@@ -3074,7 +2946,7 @@
           <a:p>
             <a:fld id="{D535FA3B-C92A-41BC-9641-F0D200EBA4B7}" type="datetimeFigureOut">
               <a:rPr lang="en-CA" smtClean="0"/>
-              <a:t>2017-05-01</a:t>
+              <a:t>2017-04-28</a:t>
             </a:fld>
             <a:endParaRPr lang="en-CA"/>
           </a:p>
@@ -3415,7 +3287,7 @@
           <a:p>
             <a:fld id="{D535FA3B-C92A-41BC-9641-F0D200EBA4B7}" type="datetimeFigureOut">
               <a:rPr lang="en-CA" smtClean="0"/>
-              <a:t>2017-05-01</a:t>
+              <a:t>2017-04-28</a:t>
             </a:fld>
             <a:endParaRPr lang="en-CA"/>
           </a:p>
@@ -3729,7 +3601,7 @@
           <a:p>
             <a:fld id="{D535FA3B-C92A-41BC-9641-F0D200EBA4B7}" type="datetimeFigureOut">
               <a:rPr lang="en-CA" smtClean="0"/>
-              <a:t>2017-05-01</a:t>
+              <a:t>2017-04-28</a:t>
             </a:fld>
             <a:endParaRPr lang="en-CA"/>
           </a:p>
@@ -4122,7 +3994,7 @@
           <a:p>
             <a:fld id="{D535FA3B-C92A-41BC-9641-F0D200EBA4B7}" type="datetimeFigureOut">
               <a:rPr lang="en-CA" smtClean="0"/>
-              <a:t>2017-05-01</a:t>
+              <a:t>2017-04-28</a:t>
             </a:fld>
             <a:endParaRPr lang="en-CA"/>
           </a:p>
@@ -4292,7 +4164,7 @@
           <a:p>
             <a:fld id="{D535FA3B-C92A-41BC-9641-F0D200EBA4B7}" type="datetimeFigureOut">
               <a:rPr lang="en-CA" smtClean="0"/>
-              <a:t>2017-05-01</a:t>
+              <a:t>2017-04-28</a:t>
             </a:fld>
             <a:endParaRPr lang="en-CA"/>
           </a:p>
@@ -4472,7 +4344,7 @@
           <a:p>
             <a:fld id="{D535FA3B-C92A-41BC-9641-F0D200EBA4B7}" type="datetimeFigureOut">
               <a:rPr lang="en-CA" smtClean="0"/>
-              <a:t>2017-05-01</a:t>
+              <a:t>2017-04-28</a:t>
             </a:fld>
             <a:endParaRPr lang="en-CA"/>
           </a:p>
@@ -4648,7 +4520,7 @@
           <a:p>
             <a:fld id="{D535FA3B-C92A-41BC-9641-F0D200EBA4B7}" type="datetimeFigureOut">
               <a:rPr lang="en-CA" smtClean="0"/>
-              <a:t>2017-05-01</a:t>
+              <a:t>2017-04-28</a:t>
             </a:fld>
             <a:endParaRPr lang="en-CA"/>
           </a:p>
@@ -4895,7 +4767,7 @@
           <a:p>
             <a:fld id="{D535FA3B-C92A-41BC-9641-F0D200EBA4B7}" type="datetimeFigureOut">
               <a:rPr lang="en-CA" smtClean="0"/>
-              <a:t>2017-05-01</a:t>
+              <a:t>2017-04-28</a:t>
             </a:fld>
             <a:endParaRPr lang="en-CA"/>
           </a:p>
@@ -5127,7 +4999,7 @@
           <a:p>
             <a:fld id="{D535FA3B-C92A-41BC-9641-F0D200EBA4B7}" type="datetimeFigureOut">
               <a:rPr lang="en-CA" smtClean="0"/>
-              <a:t>2017-05-01</a:t>
+              <a:t>2017-04-28</a:t>
             </a:fld>
             <a:endParaRPr lang="en-CA"/>
           </a:p>
@@ -5506,7 +5378,7 @@
           <a:p>
             <a:fld id="{D535FA3B-C92A-41BC-9641-F0D200EBA4B7}" type="datetimeFigureOut">
               <a:rPr lang="en-CA" smtClean="0"/>
-              <a:t>2017-05-01</a:t>
+              <a:t>2017-04-28</a:t>
             </a:fld>
             <a:endParaRPr lang="en-CA"/>
           </a:p>
@@ -5634,7 +5506,7 @@
           <a:p>
             <a:fld id="{D535FA3B-C92A-41BC-9641-F0D200EBA4B7}" type="datetimeFigureOut">
               <a:rPr lang="en-CA" smtClean="0"/>
-              <a:t>2017-05-01</a:t>
+              <a:t>2017-04-28</a:t>
             </a:fld>
             <a:endParaRPr lang="en-CA"/>
           </a:p>
@@ -5729,7 +5601,7 @@
           <a:p>
             <a:fld id="{D535FA3B-C92A-41BC-9641-F0D200EBA4B7}" type="datetimeFigureOut">
               <a:rPr lang="en-CA" smtClean="0"/>
-              <a:t>2017-05-01</a:t>
+              <a:t>2017-04-28</a:t>
             </a:fld>
             <a:endParaRPr lang="en-CA"/>
           </a:p>
@@ -5989,7 +5861,7 @@
           <a:p>
             <a:fld id="{D535FA3B-C92A-41BC-9641-F0D200EBA4B7}" type="datetimeFigureOut">
               <a:rPr lang="en-CA" smtClean="0"/>
-              <a:t>2017-05-01</a:t>
+              <a:t>2017-04-28</a:t>
             </a:fld>
             <a:endParaRPr lang="en-CA"/>
           </a:p>
@@ -6257,7 +6129,7 @@
           <a:p>
             <a:fld id="{D535FA3B-C92A-41BC-9641-F0D200EBA4B7}" type="datetimeFigureOut">
               <a:rPr lang="en-CA" smtClean="0"/>
-              <a:t>2017-05-01</a:t>
+              <a:t>2017-04-28</a:t>
             </a:fld>
             <a:endParaRPr lang="en-CA"/>
           </a:p>
@@ -7000,7 +6872,7 @@
           <a:p>
             <a:fld id="{D535FA3B-C92A-41BC-9641-F0D200EBA4B7}" type="datetimeFigureOut">
               <a:rPr lang="en-CA" smtClean="0"/>
-              <a:t>2017-05-01</a:t>
+              <a:t>2017-04-28</a:t>
             </a:fld>
             <a:endParaRPr lang="en-CA"/>
           </a:p>
@@ -13597,28 +13469,28 @@
                 <a:gridCol w="2149035">
                   <a:extLst>
                     <a:ext uri="{9D8B030D-6E8A-4147-A177-3AD203B41FA5}">
-                      <a16:colId xmlns="" xmlns:a16="http://schemas.microsoft.com/office/drawing/2014/main" val="2785451794"/>
+                      <a16:colId xmlns:a16="http://schemas.microsoft.com/office/drawing/2014/main" val="2785451794"/>
                     </a:ext>
                   </a:extLst>
                 </a:gridCol>
                 <a:gridCol w="2149035">
                   <a:extLst>
                     <a:ext uri="{9D8B030D-6E8A-4147-A177-3AD203B41FA5}">
-                      <a16:colId xmlns="" xmlns:a16="http://schemas.microsoft.com/office/drawing/2014/main" val="4019512300"/>
+                      <a16:colId xmlns:a16="http://schemas.microsoft.com/office/drawing/2014/main" val="4019512300"/>
                     </a:ext>
                   </a:extLst>
                 </a:gridCol>
                 <a:gridCol w="2149035">
                   <a:extLst>
                     <a:ext uri="{9D8B030D-6E8A-4147-A177-3AD203B41FA5}">
-                      <a16:colId xmlns="" xmlns:a16="http://schemas.microsoft.com/office/drawing/2014/main" val="2761056954"/>
+                      <a16:colId xmlns:a16="http://schemas.microsoft.com/office/drawing/2014/main" val="2761056954"/>
                     </a:ext>
                   </a:extLst>
                 </a:gridCol>
                 <a:gridCol w="2149035">
                   <a:extLst>
                     <a:ext uri="{9D8B030D-6E8A-4147-A177-3AD203B41FA5}">
-                      <a16:colId xmlns="" xmlns:a16="http://schemas.microsoft.com/office/drawing/2014/main" val="3906784518"/>
+                      <a16:colId xmlns:a16="http://schemas.microsoft.com/office/drawing/2014/main" val="3906784518"/>
                     </a:ext>
                   </a:extLst>
                 </a:gridCol>
@@ -13766,7 +13638,7 @@
                 </a:tc>
                 <a:extLst>
                   <a:ext uri="{0D108BD9-81ED-4DB2-BD59-A6C34878D82A}">
-                    <a16:rowId xmlns="" xmlns:a16="http://schemas.microsoft.com/office/drawing/2014/main" val="2851917135"/>
+                    <a16:rowId xmlns:a16="http://schemas.microsoft.com/office/drawing/2014/main" val="2851917135"/>
                   </a:ext>
                 </a:extLst>
               </a:tr>
@@ -13924,7 +13796,7 @@
                 </a:tc>
                 <a:extLst>
                   <a:ext uri="{0D108BD9-81ED-4DB2-BD59-A6C34878D82A}">
-                    <a16:rowId xmlns="" xmlns:a16="http://schemas.microsoft.com/office/drawing/2014/main" val="969570850"/>
+                    <a16:rowId xmlns:a16="http://schemas.microsoft.com/office/drawing/2014/main" val="969570850"/>
                   </a:ext>
                 </a:extLst>
               </a:tr>
@@ -14082,7 +13954,7 @@
                 </a:tc>
                 <a:extLst>
                   <a:ext uri="{0D108BD9-81ED-4DB2-BD59-A6C34878D82A}">
-                    <a16:rowId xmlns="" xmlns:a16="http://schemas.microsoft.com/office/drawing/2014/main" val="1182322791"/>
+                    <a16:rowId xmlns:a16="http://schemas.microsoft.com/office/drawing/2014/main" val="1182322791"/>
                   </a:ext>
                 </a:extLst>
               </a:tr>
@@ -14240,7 +14112,7 @@
                 </a:tc>
                 <a:extLst>
                   <a:ext uri="{0D108BD9-81ED-4DB2-BD59-A6C34878D82A}">
-                    <a16:rowId xmlns="" xmlns:a16="http://schemas.microsoft.com/office/drawing/2014/main" val="2803583754"/>
+                    <a16:rowId xmlns:a16="http://schemas.microsoft.com/office/drawing/2014/main" val="2803583754"/>
                   </a:ext>
                 </a:extLst>
               </a:tr>
@@ -14398,7 +14270,7 @@
                 </a:tc>
                 <a:extLst>
                   <a:ext uri="{0D108BD9-81ED-4DB2-BD59-A6C34878D82A}">
-                    <a16:rowId xmlns="" xmlns:a16="http://schemas.microsoft.com/office/drawing/2014/main" val="1505999084"/>
+                    <a16:rowId xmlns:a16="http://schemas.microsoft.com/office/drawing/2014/main" val="1505999084"/>
                   </a:ext>
                 </a:extLst>
               </a:tr>

</xml_diff>